<commit_message>
Playing with Chapter 4
</commit_message>
<xml_diff>
--- a/lectures/KR-4.pptx
+++ b/lectures/KR-4.pptx
@@ -7,8 +7,12 @@
   <p:sldIdLst>
     <p:sldId id="256" r:id="rId2"/>
     <p:sldId id="287" r:id="rId3"/>
-    <p:sldId id="284" r:id="rId4"/>
-    <p:sldId id="285" r:id="rId5"/>
+    <p:sldId id="288" r:id="rId4"/>
+    <p:sldId id="289" r:id="rId5"/>
+    <p:sldId id="290" r:id="rId6"/>
+    <p:sldId id="291" r:id="rId7"/>
+    <p:sldId id="284" r:id="rId8"/>
+    <p:sldId id="285" r:id="rId9"/>
   </p:sldIdLst>
   <p:sldSz cx="12192000" cy="6858000"/>
   <p:notesSz cx="6858000" cy="9144000"/>
@@ -262,7 +266,7 @@
           <a:p>
             <a:fld id="{C13A938A-C9BA-0346-A74F-83EB1631032C}" type="datetimeFigureOut">
               <a:rPr lang="en-US" smtClean="0"/>
-              <a:t>7/31/22</a:t>
+              <a:t>1/23/23</a:t>
             </a:fld>
             <a:endParaRPr lang="en-US"/>
           </a:p>
@@ -460,7 +464,7 @@
           <a:p>
             <a:fld id="{C13A938A-C9BA-0346-A74F-83EB1631032C}" type="datetimeFigureOut">
               <a:rPr lang="en-US" smtClean="0"/>
-              <a:t>7/31/22</a:t>
+              <a:t>1/23/23</a:t>
             </a:fld>
             <a:endParaRPr lang="en-US"/>
           </a:p>
@@ -668,7 +672,7 @@
           <a:p>
             <a:fld id="{C13A938A-C9BA-0346-A74F-83EB1631032C}" type="datetimeFigureOut">
               <a:rPr lang="en-US" smtClean="0"/>
-              <a:t>7/31/22</a:t>
+              <a:t>1/23/23</a:t>
             </a:fld>
             <a:endParaRPr lang="en-US"/>
           </a:p>
@@ -866,7 +870,7 @@
           <a:p>
             <a:fld id="{C13A938A-C9BA-0346-A74F-83EB1631032C}" type="datetimeFigureOut">
               <a:rPr lang="en-US" smtClean="0"/>
-              <a:t>7/31/22</a:t>
+              <a:t>1/23/23</a:t>
             </a:fld>
             <a:endParaRPr lang="en-US"/>
           </a:p>
@@ -1141,7 +1145,7 @@
           <a:p>
             <a:fld id="{C13A938A-C9BA-0346-A74F-83EB1631032C}" type="datetimeFigureOut">
               <a:rPr lang="en-US" smtClean="0"/>
-              <a:t>7/31/22</a:t>
+              <a:t>1/23/23</a:t>
             </a:fld>
             <a:endParaRPr lang="en-US"/>
           </a:p>
@@ -1406,7 +1410,7 @@
           <a:p>
             <a:fld id="{C13A938A-C9BA-0346-A74F-83EB1631032C}" type="datetimeFigureOut">
               <a:rPr lang="en-US" smtClean="0"/>
-              <a:t>7/31/22</a:t>
+              <a:t>1/23/23</a:t>
             </a:fld>
             <a:endParaRPr lang="en-US"/>
           </a:p>
@@ -1818,7 +1822,7 @@
           <a:p>
             <a:fld id="{C13A938A-C9BA-0346-A74F-83EB1631032C}" type="datetimeFigureOut">
               <a:rPr lang="en-US" smtClean="0"/>
-              <a:t>7/31/22</a:t>
+              <a:t>1/23/23</a:t>
             </a:fld>
             <a:endParaRPr lang="en-US"/>
           </a:p>
@@ -1959,7 +1963,7 @@
           <a:p>
             <a:fld id="{C13A938A-C9BA-0346-A74F-83EB1631032C}" type="datetimeFigureOut">
               <a:rPr lang="en-US" smtClean="0"/>
-              <a:t>7/31/22</a:t>
+              <a:t>1/23/23</a:t>
             </a:fld>
             <a:endParaRPr lang="en-US"/>
           </a:p>
@@ -2072,7 +2076,7 @@
           <a:p>
             <a:fld id="{C13A938A-C9BA-0346-A74F-83EB1631032C}" type="datetimeFigureOut">
               <a:rPr lang="en-US" smtClean="0"/>
-              <a:t>7/31/22</a:t>
+              <a:t>1/23/23</a:t>
             </a:fld>
             <a:endParaRPr lang="en-US"/>
           </a:p>
@@ -2383,7 +2387,7 @@
           <a:p>
             <a:fld id="{C13A938A-C9BA-0346-A74F-83EB1631032C}" type="datetimeFigureOut">
               <a:rPr lang="en-US" smtClean="0"/>
-              <a:t>7/31/22</a:t>
+              <a:t>1/23/23</a:t>
             </a:fld>
             <a:endParaRPr lang="en-US"/>
           </a:p>
@@ -2671,7 +2675,7 @@
           <a:p>
             <a:fld id="{C13A938A-C9BA-0346-A74F-83EB1631032C}" type="datetimeFigureOut">
               <a:rPr lang="en-US" smtClean="0"/>
-              <a:t>7/31/22</a:t>
+              <a:t>1/23/23</a:t>
             </a:fld>
             <a:endParaRPr lang="en-US"/>
           </a:p>
@@ -2912,7 +2916,7 @@
           <a:p>
             <a:fld id="{C13A938A-C9BA-0346-A74F-83EB1631032C}" type="datetimeFigureOut">
               <a:rPr lang="en-US" smtClean="0"/>
-              <a:t>7/31/22</a:t>
+              <a:t>1/23/23</a:t>
             </a:fld>
             <a:endParaRPr lang="en-US"/>
           </a:p>
@@ -3542,7 +3546,7 @@
           <a:p>
             <a:r>
               <a:rPr lang="en-US" dirty="0"/>
-              <a:t>Section 4.2 – New and improved ‘void’ type</a:t>
+              <a:t>Section 4.1 – Automatic variables and the stack</a:t>
             </a:r>
           </a:p>
           <a:p>
@@ -3611,6 +3615,338 @@
       </p:grpSpPr>
       <p:sp>
         <p:nvSpPr>
+          <p:cNvPr id="2" name="Title 1">
+            <a:extLst>
+              <a:ext uri="{FF2B5EF4-FFF2-40B4-BE49-F238E27FC236}">
+                <a16:creationId xmlns:a16="http://schemas.microsoft.com/office/drawing/2014/main" id="{3F5C10CB-F825-A6A7-0F62-5C0BF4ADAD7F}"/>
+              </a:ext>
+            </a:extLst>
+          </p:cNvPr>
+          <p:cNvSpPr>
+            <a:spLocks noGrp="1"/>
+          </p:cNvSpPr>
+          <p:nvPr>
+            <p:ph type="title"/>
+          </p:nvPr>
+        </p:nvSpPr>
+        <p:spPr/>
+        <p:txBody>
+          <a:bodyPr/>
+          <a:lstStyle/>
+          <a:p>
+            <a:r>
+              <a:rPr lang="en-US" dirty="0"/>
+              <a:t>Automatic Variables and the Stack</a:t>
+            </a:r>
+          </a:p>
+        </p:txBody>
+      </p:sp>
+      <p:sp>
+        <p:nvSpPr>
+          <p:cNvPr id="3" name="Content Placeholder 2">
+            <a:extLst>
+              <a:ext uri="{FF2B5EF4-FFF2-40B4-BE49-F238E27FC236}">
+                <a16:creationId xmlns:a16="http://schemas.microsoft.com/office/drawing/2014/main" id="{D24102EC-796C-7284-84E1-C70122B66A12}"/>
+              </a:ext>
+            </a:extLst>
+          </p:cNvPr>
+          <p:cNvSpPr>
+            <a:spLocks noGrp="1"/>
+          </p:cNvSpPr>
+          <p:nvPr>
+            <p:ph idx="1"/>
+          </p:nvPr>
+        </p:nvSpPr>
+        <p:spPr/>
+        <p:txBody>
+          <a:bodyPr/>
+          <a:lstStyle/>
+          <a:p>
+            <a:endParaRPr lang="en-US"/>
+          </a:p>
+        </p:txBody>
+      </p:sp>
+    </p:spTree>
+    <p:extLst>
+      <p:ext uri="{BB962C8B-B14F-4D97-AF65-F5344CB8AC3E}">
+        <p14:creationId xmlns:p14="http://schemas.microsoft.com/office/powerpoint/2010/main" val="496964535"/>
+      </p:ext>
+    </p:extLst>
+  </p:cSld>
+  <p:clrMapOvr>
+    <a:masterClrMapping/>
+  </p:clrMapOvr>
+</p:sld>
+</file>
+
+<file path=ppt/slides/slide4.xml><?xml version="1.0" encoding="utf-8"?>
+<p:sld xmlns:a="http://schemas.openxmlformats.org/drawingml/2006/main" xmlns:r="http://schemas.openxmlformats.org/officeDocument/2006/relationships" xmlns:p="http://schemas.openxmlformats.org/presentationml/2006/main">
+  <p:cSld>
+    <p:spTree>
+      <p:nvGrpSpPr>
+        <p:cNvPr id="1" name=""/>
+        <p:cNvGrpSpPr/>
+        <p:nvPr/>
+      </p:nvGrpSpPr>
+      <p:grpSpPr>
+        <a:xfrm>
+          <a:off x="0" y="0"/>
+          <a:ext cx="0" cy="0"/>
+          <a:chOff x="0" y="0"/>
+          <a:chExt cx="0" cy="0"/>
+        </a:xfrm>
+      </p:grpSpPr>
+      <p:sp>
+        <p:nvSpPr>
+          <p:cNvPr id="2" name="Title 1">
+            <a:extLst>
+              <a:ext uri="{FF2B5EF4-FFF2-40B4-BE49-F238E27FC236}">
+                <a16:creationId xmlns:a16="http://schemas.microsoft.com/office/drawing/2014/main" id="{385F24F3-8CFB-3A2B-58E6-8338F5E96C74}"/>
+              </a:ext>
+            </a:extLst>
+          </p:cNvPr>
+          <p:cNvSpPr>
+            <a:spLocks noGrp="1"/>
+          </p:cNvSpPr>
+          <p:nvPr>
+            <p:ph type="title"/>
+          </p:nvPr>
+        </p:nvSpPr>
+        <p:spPr/>
+        <p:txBody>
+          <a:bodyPr/>
+          <a:lstStyle/>
+          <a:p>
+            <a:r>
+              <a:rPr lang="en-US" dirty="0"/>
+              <a:t>Arrays pass by reference</a:t>
+            </a:r>
+          </a:p>
+        </p:txBody>
+      </p:sp>
+      <p:sp>
+        <p:nvSpPr>
+          <p:cNvPr id="3" name="Content Placeholder 2">
+            <a:extLst>
+              <a:ext uri="{FF2B5EF4-FFF2-40B4-BE49-F238E27FC236}">
+                <a16:creationId xmlns:a16="http://schemas.microsoft.com/office/drawing/2014/main" id="{9E14723B-2E88-EE4E-C3F7-1C1BCD89DBFB}"/>
+              </a:ext>
+            </a:extLst>
+          </p:cNvPr>
+          <p:cNvSpPr>
+            <a:spLocks noGrp="1"/>
+          </p:cNvSpPr>
+          <p:nvPr>
+            <p:ph idx="1"/>
+          </p:nvPr>
+        </p:nvSpPr>
+        <p:spPr/>
+        <p:txBody>
+          <a:bodyPr/>
+          <a:lstStyle/>
+          <a:p>
+            <a:endParaRPr lang="en-US"/>
+          </a:p>
+        </p:txBody>
+      </p:sp>
+    </p:spTree>
+    <p:extLst>
+      <p:ext uri="{BB962C8B-B14F-4D97-AF65-F5344CB8AC3E}">
+        <p14:creationId xmlns:p14="http://schemas.microsoft.com/office/powerpoint/2010/main" val="3196115876"/>
+      </p:ext>
+    </p:extLst>
+  </p:cSld>
+  <p:clrMapOvr>
+    <a:masterClrMapping/>
+  </p:clrMapOvr>
+</p:sld>
+</file>
+
+<file path=ppt/slides/slide5.xml><?xml version="1.0" encoding="utf-8"?>
+<p:sld xmlns:a="http://schemas.openxmlformats.org/drawingml/2006/main" xmlns:r="http://schemas.openxmlformats.org/officeDocument/2006/relationships" xmlns:p="http://schemas.openxmlformats.org/presentationml/2006/main">
+  <p:cSld>
+    <p:spTree>
+      <p:nvGrpSpPr>
+        <p:cNvPr id="1" name=""/>
+        <p:cNvGrpSpPr/>
+        <p:nvPr/>
+      </p:nvGrpSpPr>
+      <p:grpSpPr>
+        <a:xfrm>
+          <a:off x="0" y="0"/>
+          <a:ext cx="0" cy="0"/>
+          <a:chOff x="0" y="0"/>
+          <a:chExt cx="0" cy="0"/>
+        </a:xfrm>
+      </p:grpSpPr>
+      <p:sp>
+        <p:nvSpPr>
+          <p:cNvPr id="2" name="Title 1">
+            <a:extLst>
+              <a:ext uri="{FF2B5EF4-FFF2-40B4-BE49-F238E27FC236}">
+                <a16:creationId xmlns:a16="http://schemas.microsoft.com/office/drawing/2014/main" id="{617513D2-75CA-9FF5-AF46-15E529B6E5B9}"/>
+              </a:ext>
+            </a:extLst>
+          </p:cNvPr>
+          <p:cNvSpPr>
+            <a:spLocks noGrp="1"/>
+          </p:cNvSpPr>
+          <p:nvPr>
+            <p:ph type="title"/>
+          </p:nvPr>
+        </p:nvSpPr>
+        <p:spPr/>
+        <p:txBody>
+          <a:bodyPr/>
+          <a:lstStyle/>
+          <a:p>
+            <a:r>
+              <a:rPr lang="en-US" dirty="0"/>
+              <a:t>Recursion, see recursion</a:t>
+            </a:r>
+          </a:p>
+        </p:txBody>
+      </p:sp>
+      <p:sp>
+        <p:nvSpPr>
+          <p:cNvPr id="3" name="Content Placeholder 2">
+            <a:extLst>
+              <a:ext uri="{FF2B5EF4-FFF2-40B4-BE49-F238E27FC236}">
+                <a16:creationId xmlns:a16="http://schemas.microsoft.com/office/drawing/2014/main" id="{7DAC45BB-9830-1EBE-B746-2FA7FEC20F2F}"/>
+              </a:ext>
+            </a:extLst>
+          </p:cNvPr>
+          <p:cNvSpPr>
+            <a:spLocks noGrp="1"/>
+          </p:cNvSpPr>
+          <p:nvPr>
+            <p:ph idx="1"/>
+          </p:nvPr>
+        </p:nvSpPr>
+        <p:spPr/>
+        <p:txBody>
+          <a:bodyPr/>
+          <a:lstStyle/>
+          <a:p>
+            <a:endParaRPr lang="en-US"/>
+          </a:p>
+        </p:txBody>
+      </p:sp>
+    </p:spTree>
+    <p:extLst>
+      <p:ext uri="{BB962C8B-B14F-4D97-AF65-F5344CB8AC3E}">
+        <p14:creationId xmlns:p14="http://schemas.microsoft.com/office/powerpoint/2010/main" val="1546743805"/>
+      </p:ext>
+    </p:extLst>
+  </p:cSld>
+  <p:clrMapOvr>
+    <a:masterClrMapping/>
+  </p:clrMapOvr>
+</p:sld>
+</file>
+
+<file path=ppt/slides/slide6.xml><?xml version="1.0" encoding="utf-8"?>
+<p:sld xmlns:a="http://schemas.openxmlformats.org/drawingml/2006/main" xmlns:r="http://schemas.openxmlformats.org/officeDocument/2006/relationships" xmlns:p="http://schemas.openxmlformats.org/presentationml/2006/main">
+  <p:cSld>
+    <p:spTree>
+      <p:nvGrpSpPr>
+        <p:cNvPr id="1" name=""/>
+        <p:cNvGrpSpPr/>
+        <p:nvPr/>
+      </p:nvGrpSpPr>
+      <p:grpSpPr>
+        <a:xfrm>
+          <a:off x="0" y="0"/>
+          <a:ext cx="0" cy="0"/>
+          <a:chOff x="0" y="0"/>
+          <a:chExt cx="0" cy="0"/>
+        </a:xfrm>
+      </p:grpSpPr>
+      <p:sp>
+        <p:nvSpPr>
+          <p:cNvPr id="2" name="Title 1">
+            <a:extLst>
+              <a:ext uri="{FF2B5EF4-FFF2-40B4-BE49-F238E27FC236}">
+                <a16:creationId xmlns:a16="http://schemas.microsoft.com/office/drawing/2014/main" id="{A873E460-3B9E-0C94-30C0-5AA55AAF307F}"/>
+              </a:ext>
+            </a:extLst>
+          </p:cNvPr>
+          <p:cNvSpPr>
+            <a:spLocks noGrp="1"/>
+          </p:cNvSpPr>
+          <p:nvPr>
+            <p:ph type="title"/>
+          </p:nvPr>
+        </p:nvSpPr>
+        <p:spPr/>
+        <p:txBody>
+          <a:bodyPr/>
+          <a:lstStyle/>
+          <a:p>
+            <a:r>
+              <a:rPr lang="en-US" dirty="0"/>
+              <a:t>The C Pre Processor</a:t>
+            </a:r>
+          </a:p>
+        </p:txBody>
+      </p:sp>
+      <p:sp>
+        <p:nvSpPr>
+          <p:cNvPr id="3" name="Content Placeholder 2">
+            <a:extLst>
+              <a:ext uri="{FF2B5EF4-FFF2-40B4-BE49-F238E27FC236}">
+                <a16:creationId xmlns:a16="http://schemas.microsoft.com/office/drawing/2014/main" id="{D4AF128A-08B5-673B-CFE8-E3156CD0D2DB}"/>
+              </a:ext>
+            </a:extLst>
+          </p:cNvPr>
+          <p:cNvSpPr>
+            <a:spLocks noGrp="1"/>
+          </p:cNvSpPr>
+          <p:nvPr>
+            <p:ph idx="1"/>
+          </p:nvPr>
+        </p:nvSpPr>
+        <p:spPr/>
+        <p:txBody>
+          <a:bodyPr/>
+          <a:lstStyle/>
+          <a:p>
+            <a:endParaRPr lang="en-US"/>
+          </a:p>
+        </p:txBody>
+      </p:sp>
+    </p:spTree>
+    <p:extLst>
+      <p:ext uri="{BB962C8B-B14F-4D97-AF65-F5344CB8AC3E}">
+        <p14:creationId xmlns:p14="http://schemas.microsoft.com/office/powerpoint/2010/main" val="2244150091"/>
+      </p:ext>
+    </p:extLst>
+  </p:cSld>
+  <p:clrMapOvr>
+    <a:masterClrMapping/>
+  </p:clrMapOvr>
+</p:sld>
+</file>
+
+<file path=ppt/slides/slide7.xml><?xml version="1.0" encoding="utf-8"?>
+<p:sld xmlns:a="http://schemas.openxmlformats.org/drawingml/2006/main" xmlns:r="http://schemas.openxmlformats.org/officeDocument/2006/relationships" xmlns:p="http://schemas.openxmlformats.org/presentationml/2006/main">
+  <p:cSld>
+    <p:spTree>
+      <p:nvGrpSpPr>
+        <p:cNvPr id="1" name=""/>
+        <p:cNvGrpSpPr/>
+        <p:nvPr/>
+      </p:nvGrpSpPr>
+      <p:grpSpPr>
+        <a:xfrm>
+          <a:off x="0" y="0"/>
+          <a:ext cx="0" cy="0"/>
+          <a:chOff x="0" y="0"/>
+          <a:chExt cx="0" cy="0"/>
+        </a:xfrm>
+      </p:grpSpPr>
+      <p:sp>
+        <p:nvSpPr>
           <p:cNvPr id="3" name="Title 2">
             <a:extLst>
               <a:ext uri="{FF2B5EF4-FFF2-40B4-BE49-F238E27FC236}">
@@ -3639,51 +3975,47 @@
       </p:sp>
       <p:sp>
         <p:nvSpPr>
-          <p:cNvPr id="4" name="Content Placeholder 3">
-            <a:extLst>
-              <a:ext uri="{FF2B5EF4-FFF2-40B4-BE49-F238E27FC236}">
-                <a16:creationId xmlns:a16="http://schemas.microsoft.com/office/drawing/2014/main" id="{4EAA055D-FA59-02F9-40B6-72AFC8A29A76}"/>
-              </a:ext>
-            </a:extLst>
-          </p:cNvPr>
-          <p:cNvSpPr>
-            <a:spLocks noGrp="1"/>
-          </p:cNvSpPr>
-          <p:nvPr>
-            <p:ph sz="half" idx="1"/>
-          </p:nvPr>
-        </p:nvSpPr>
-        <p:spPr/>
-        <p:txBody>
-          <a:bodyPr/>
-          <a:lstStyle/>
-          <a:p>
-            <a:endParaRPr lang="en-US" dirty="0"/>
-          </a:p>
-        </p:txBody>
-      </p:sp>
-      <p:sp>
-        <p:nvSpPr>
-          <p:cNvPr id="5" name="Content Placeholder 4">
-            <a:extLst>
-              <a:ext uri="{FF2B5EF4-FFF2-40B4-BE49-F238E27FC236}">
-                <a16:creationId xmlns:a16="http://schemas.microsoft.com/office/drawing/2014/main" id="{23FD6821-0D52-C591-FBFA-4AB416D5DA58}"/>
-              </a:ext>
-            </a:extLst>
-          </p:cNvPr>
-          <p:cNvSpPr>
-            <a:spLocks noGrp="1"/>
-          </p:cNvSpPr>
-          <p:nvPr>
-            <p:ph sz="half" idx="2"/>
-          </p:nvPr>
-        </p:nvSpPr>
-        <p:spPr/>
-        <p:txBody>
-          <a:bodyPr/>
-          <a:lstStyle/>
-          <a:p>
-            <a:endParaRPr lang="en-US" dirty="0"/>
+          <p:cNvPr id="2" name="Content Placeholder 1">
+            <a:extLst>
+              <a:ext uri="{FF2B5EF4-FFF2-40B4-BE49-F238E27FC236}">
+                <a16:creationId xmlns:a16="http://schemas.microsoft.com/office/drawing/2014/main" id="{50791E68-B219-7E1C-2218-042D2ED13759}"/>
+              </a:ext>
+            </a:extLst>
+          </p:cNvPr>
+          <p:cNvSpPr>
+            <a:spLocks noGrp="1"/>
+          </p:cNvSpPr>
+          <p:nvPr>
+            <p:ph idx="1"/>
+          </p:nvPr>
+        </p:nvSpPr>
+        <p:spPr/>
+        <p:txBody>
+          <a:bodyPr/>
+          <a:lstStyle/>
+          <a:p>
+            <a:r>
+              <a:rPr lang="en-US" dirty="0"/>
+              <a:t>Void type – the universal pointer</a:t>
+            </a:r>
+          </a:p>
+          <a:p>
+            <a:r>
+              <a:rPr lang="en-US" dirty="0"/>
+              <a:t>Passing arrays by reference</a:t>
+            </a:r>
+          </a:p>
+          <a:p>
+            <a:r>
+              <a:rPr lang="en-US" dirty="0"/>
+              <a:t>Recursion</a:t>
+            </a:r>
+          </a:p>
+          <a:p>
+            <a:r>
+              <a:rPr lang="en-US" dirty="0"/>
+              <a:t>The Pre Processor</a:t>
+            </a:r>
           </a:p>
         </p:txBody>
       </p:sp>
@@ -3700,7 +4032,7 @@
 </p:sld>
 </file>
 
-<file path=ppt/slides/slide4.xml><?xml version="1.0" encoding="utf-8"?>
+<file path=ppt/slides/slide8.xml><?xml version="1.0" encoding="utf-8"?>
 <p:sld xmlns:a="http://schemas.openxmlformats.org/drawingml/2006/main" xmlns:r="http://schemas.openxmlformats.org/officeDocument/2006/relationships" xmlns:p="http://schemas.openxmlformats.org/presentationml/2006/main">
   <p:cSld>
     <p:spTree>

</xml_diff>